<commit_message>
deleted animation on answer slide
</commit_message>
<xml_diff>
--- a/Recap/RecapPP.pptx
+++ b/Recap/RecapPP.pptx
@@ -4450,6 +4450,13 @@
   <p:clrMapOvr>
     <a:masterClrMapping/>
   </p:clrMapOvr>
+  <p:timing>
+    <p:tnLst>
+      <p:par>
+        <p:cTn id="1" dur="indefinite" restart="never" nodeType="tmRoot"/>
+      </p:par>
+    </p:tnLst>
+  </p:timing>
 </p:sld>
 </file>
 
@@ -5367,159 +5374,7 @@
   <p:timing>
     <p:tnLst>
       <p:par>
-        <p:cTn id="1" dur="indefinite" restart="never" nodeType="tmRoot">
-          <p:childTnLst>
-            <p:seq concurrent="1" nextAc="seek">
-              <p:cTn id="2" dur="indefinite" nodeType="mainSeq">
-                <p:childTnLst>
-                  <p:par>
-                    <p:cTn id="3" fill="hold">
-                      <p:stCondLst>
-                        <p:cond delay="indefinite"/>
-                      </p:stCondLst>
-                      <p:childTnLst>
-                        <p:par>
-                          <p:cTn id="4" fill="hold">
-                            <p:stCondLst>
-                              <p:cond delay="0"/>
-                            </p:stCondLst>
-                            <p:childTnLst>
-                              <p:par>
-                                <p:cTn id="5" presetID="1" presetClass="entr" presetSubtype="0" fill="hold" nodeType="clickEffect">
-                                  <p:stCondLst>
-                                    <p:cond delay="0"/>
-                                  </p:stCondLst>
-                                  <p:childTnLst>
-                                    <p:set>
-                                      <p:cBhvr>
-                                        <p:cTn id="6" dur="1" fill="hold">
-                                          <p:stCondLst>
-                                            <p:cond delay="0"/>
-                                          </p:stCondLst>
-                                        </p:cTn>
-                                        <p:tgtEl>
-                                          <p:spTgt spid="3">
-                                            <p:txEl>
-                                              <p:pRg st="4" end="4"/>
-                                            </p:txEl>
-                                          </p:spTgt>
-                                        </p:tgtEl>
-                                        <p:attrNameLst>
-                                          <p:attrName>style.visibility</p:attrName>
-                                        </p:attrNameLst>
-                                      </p:cBhvr>
-                                      <p:to>
-                                        <p:strVal val="visible"/>
-                                      </p:to>
-                                    </p:set>
-                                  </p:childTnLst>
-                                </p:cTn>
-                              </p:par>
-                              <p:par>
-                                <p:cTn id="7" presetID="1" presetClass="entr" presetSubtype="0" fill="hold" nodeType="withEffect">
-                                  <p:stCondLst>
-                                    <p:cond delay="0"/>
-                                  </p:stCondLst>
-                                  <p:childTnLst>
-                                    <p:set>
-                                      <p:cBhvr>
-                                        <p:cTn id="8" dur="1" fill="hold">
-                                          <p:stCondLst>
-                                            <p:cond delay="0"/>
-                                          </p:stCondLst>
-                                        </p:cTn>
-                                        <p:tgtEl>
-                                          <p:spTgt spid="3">
-                                            <p:txEl>
-                                              <p:pRg st="5" end="5"/>
-                                            </p:txEl>
-                                          </p:spTgt>
-                                        </p:tgtEl>
-                                        <p:attrNameLst>
-                                          <p:attrName>style.visibility</p:attrName>
-                                        </p:attrNameLst>
-                                      </p:cBhvr>
-                                      <p:to>
-                                        <p:strVal val="visible"/>
-                                      </p:to>
-                                    </p:set>
-                                  </p:childTnLst>
-                                </p:cTn>
-                              </p:par>
-                            </p:childTnLst>
-                          </p:cTn>
-                        </p:par>
-                      </p:childTnLst>
-                    </p:cTn>
-                  </p:par>
-                  <p:par>
-                    <p:cTn id="9" fill="hold">
-                      <p:stCondLst>
-                        <p:cond delay="indefinite"/>
-                      </p:stCondLst>
-                      <p:childTnLst>
-                        <p:par>
-                          <p:cTn id="10" fill="hold">
-                            <p:stCondLst>
-                              <p:cond delay="0"/>
-                            </p:stCondLst>
-                            <p:childTnLst>
-                              <p:par>
-                                <p:cTn id="11" presetID="1" presetClass="entr" presetSubtype="0" fill="hold" nodeType="clickEffect">
-                                  <p:stCondLst>
-                                    <p:cond delay="0"/>
-                                  </p:stCondLst>
-                                  <p:childTnLst>
-                                    <p:set>
-                                      <p:cBhvr>
-                                        <p:cTn id="12" dur="1" fill="hold">
-                                          <p:stCondLst>
-                                            <p:cond delay="0"/>
-                                          </p:stCondLst>
-                                        </p:cTn>
-                                        <p:tgtEl>
-                                          <p:spTgt spid="3">
-                                            <p:txEl>
-                                              <p:pRg st="8" end="8"/>
-                                            </p:txEl>
-                                          </p:spTgt>
-                                        </p:tgtEl>
-                                        <p:attrNameLst>
-                                          <p:attrName>style.visibility</p:attrName>
-                                        </p:attrNameLst>
-                                      </p:cBhvr>
-                                      <p:to>
-                                        <p:strVal val="visible"/>
-                                      </p:to>
-                                    </p:set>
-                                  </p:childTnLst>
-                                </p:cTn>
-                              </p:par>
-                            </p:childTnLst>
-                          </p:cTn>
-                        </p:par>
-                      </p:childTnLst>
-                    </p:cTn>
-                  </p:par>
-                </p:childTnLst>
-              </p:cTn>
-              <p:prevCondLst>
-                <p:cond evt="onPrev" delay="0">
-                  <p:tgtEl>
-                    <p:sldTgt/>
-                  </p:tgtEl>
-                </p:cond>
-              </p:prevCondLst>
-              <p:nextCondLst>
-                <p:cond evt="onNext" delay="0">
-                  <p:tgtEl>
-                    <p:sldTgt/>
-                  </p:tgtEl>
-                </p:cond>
-              </p:nextCondLst>
-            </p:seq>
-          </p:childTnLst>
-        </p:cTn>
+        <p:cTn id="1" dur="indefinite" restart="never" nodeType="tmRoot"/>
       </p:par>
     </p:tnLst>
   </p:timing>

</xml_diff>